<commit_message>
Tweak files during day
</commit_message>
<xml_diff>
--- a/dia1/lab1_integration.pptx
+++ b/dia1/lab1_integration.pptx
@@ -212,7 +212,7 @@
           <a:p>
             <a:fld id="{F2388989-7179-4868-8471-A7A056B96C7C}" type="datetimeFigureOut">
               <a:rPr lang="en-US" smtClean="0"/>
-              <a:t>1/13/2019</a:t>
+              <a:t>1/14/2019</a:t>
             </a:fld>
             <a:endParaRPr lang="en-US"/>
           </a:p>
@@ -703,7 +703,7 @@
           <a:p>
             <a:fld id="{473094AD-038C-43A2-A4DE-BB0813E6E51E}" type="datetime1">
               <a:rPr lang="en-US" smtClean="0"/>
-              <a:t>1/13/2019</a:t>
+              <a:t>1/14/2019</a:t>
             </a:fld>
             <a:endParaRPr lang="en-US"/>
           </a:p>
@@ -890,7 +890,7 @@
           <a:p>
             <a:fld id="{1F0E199C-061B-4949-9C96-AC248C0D8DD3}" type="datetime1">
               <a:rPr lang="en-US" smtClean="0"/>
-              <a:t>1/13/2019</a:t>
+              <a:t>1/14/2019</a:t>
             </a:fld>
             <a:endParaRPr lang="en-US"/>
           </a:p>
@@ -1086,7 +1086,7 @@
           <a:p>
             <a:fld id="{EF845CA7-EB4A-4003-96F7-46C5013AEA42}" type="datetime1">
               <a:rPr lang="en-US" smtClean="0"/>
-              <a:t>1/13/2019</a:t>
+              <a:t>1/14/2019</a:t>
             </a:fld>
             <a:endParaRPr lang="en-US"/>
           </a:p>
@@ -1338,7 +1338,7 @@
           <a:p>
             <a:fld id="{2D858B87-F135-4381-8E7E-B64D4228932C}" type="datetime1">
               <a:rPr lang="en-US" smtClean="0"/>
-              <a:t>1/13/2019</a:t>
+              <a:t>1/14/2019</a:t>
             </a:fld>
             <a:endParaRPr lang="en-US"/>
           </a:p>
@@ -1562,7 +1562,7 @@
           <a:p>
             <a:fld id="{3B3C5764-E191-4322-8BA3-3D7CBE2CF8D1}" type="datetime1">
               <a:rPr lang="en-US" smtClean="0"/>
-              <a:t>1/13/2019</a:t>
+              <a:t>1/14/2019</a:t>
             </a:fld>
             <a:endParaRPr lang="en-US"/>
           </a:p>
@@ -1870,7 +1870,7 @@
           <a:p>
             <a:fld id="{CCFF9CC7-9DD7-495E-8E0C-D2152E7ED385}" type="datetime1">
               <a:rPr lang="en-US" smtClean="0"/>
-              <a:t>1/13/2019</a:t>
+              <a:t>1/14/2019</a:t>
             </a:fld>
             <a:endParaRPr lang="en-US"/>
           </a:p>
@@ -2038,7 +2038,7 @@
           <a:p>
             <a:fld id="{7AF3F41F-A6FA-40C5-99E0-3F86C98F6608}" type="datetime1">
               <a:rPr lang="en-US" smtClean="0"/>
-              <a:t>1/13/2019</a:t>
+              <a:t>1/14/2019</a:t>
             </a:fld>
             <a:endParaRPr lang="en-US"/>
           </a:p>
@@ -2350,7 +2350,7 @@
           <a:p>
             <a:fld id="{9620DF9F-793E-4985-B9D8-992C6E2DA332}" type="datetime1">
               <a:rPr lang="en-US" smtClean="0"/>
-              <a:t>1/13/2019</a:t>
+              <a:t>1/14/2019</a:t>
             </a:fld>
             <a:endParaRPr lang="en-US"/>
           </a:p>
@@ -2662,7 +2662,7 @@
           <a:p>
             <a:fld id="{796EA9D4-2AD1-4101-A286-77D37AAADFED}" type="datetime1">
               <a:rPr lang="en-US" smtClean="0"/>
-              <a:t>1/13/2019</a:t>
+              <a:t>1/14/2019</a:t>
             </a:fld>
             <a:endParaRPr lang="en-US"/>
           </a:p>
@@ -2882,7 +2882,7 @@
           <a:p>
             <a:fld id="{2BD0993A-8691-4A87-9C49-3CE884C47D45}" type="datetime1">
               <a:rPr lang="en-US" smtClean="0"/>
-              <a:t>1/13/2019</a:t>
+              <a:t>1/14/2019</a:t>
             </a:fld>
             <a:endParaRPr lang="en-US"/>
           </a:p>
@@ -3080,7 +3080,7 @@
           <a:p>
             <a:fld id="{BF316B00-A11D-4D80-BD0B-755A2969FF78}" type="datetime1">
               <a:rPr lang="en-US" smtClean="0"/>
-              <a:t>1/13/2019</a:t>
+              <a:t>1/14/2019</a:t>
             </a:fld>
             <a:endParaRPr lang="en-US"/>
           </a:p>
@@ -3266,7 +3266,7 @@
           <a:p>
             <a:fld id="{FB49576D-E9F4-42BB-BC13-B23B3C4B0843}" type="datetime1">
               <a:rPr lang="en-US" smtClean="0"/>
-              <a:t>1/13/2019</a:t>
+              <a:t>1/14/2019</a:t>
             </a:fld>
             <a:endParaRPr lang="en-US"/>
           </a:p>
@@ -3541,7 +3541,7 @@
           <a:p>
             <a:fld id="{C79C30F5-8523-4EB9-ACC0-9A01E3FEDA29}" type="datetime1">
               <a:rPr lang="en-US" smtClean="0"/>
-              <a:t>1/13/2019</a:t>
+              <a:t>1/14/2019</a:t>
             </a:fld>
             <a:endParaRPr lang="en-US"/>
           </a:p>
@@ -3806,7 +3806,7 @@
           <a:p>
             <a:fld id="{31EA960D-B428-435A-A5E7-264A6D063906}" type="datetime1">
               <a:rPr lang="en-US" smtClean="0"/>
-              <a:t>1/13/2019</a:t>
+              <a:t>1/14/2019</a:t>
             </a:fld>
             <a:endParaRPr lang="en-US"/>
           </a:p>
@@ -4218,7 +4218,7 @@
           <a:p>
             <a:fld id="{3C27B052-FF7D-466F-9234-659183862C88}" type="datetime1">
               <a:rPr lang="en-US" smtClean="0"/>
-              <a:t>1/13/2019</a:t>
+              <a:t>1/14/2019</a:t>
             </a:fld>
             <a:endParaRPr lang="en-US"/>
           </a:p>
@@ -4359,7 +4359,7 @@
           <a:p>
             <a:fld id="{30E86C0C-8755-49A7-BEFB-7AA12254EBB9}" type="datetime1">
               <a:rPr lang="en-US" smtClean="0"/>
-              <a:t>1/13/2019</a:t>
+              <a:t>1/14/2019</a:t>
             </a:fld>
             <a:endParaRPr lang="en-US"/>
           </a:p>
@@ -4472,7 +4472,7 @@
           <a:p>
             <a:fld id="{E8B48827-F8F9-4844-A257-9CA23F7E0DA1}" type="datetime1">
               <a:rPr lang="en-US" smtClean="0"/>
-              <a:t>1/13/2019</a:t>
+              <a:t>1/14/2019</a:t>
             </a:fld>
             <a:endParaRPr lang="en-US"/>
           </a:p>
@@ -4783,7 +4783,7 @@
           <a:p>
             <a:fld id="{EE8BAE2C-037A-4C2F-87D7-09EE32575BC5}" type="datetime1">
               <a:rPr lang="en-US" smtClean="0"/>
-              <a:t>1/13/2019</a:t>
+              <a:t>1/14/2019</a:t>
             </a:fld>
             <a:endParaRPr lang="en-US"/>
           </a:p>
@@ -5074,7 +5074,7 @@
           <a:p>
             <a:fld id="{33BA7458-4B9B-4BD7-9049-0CDF114B9A90}" type="datetime1">
               <a:rPr lang="en-US" smtClean="0"/>
-              <a:t>1/13/2019</a:t>
+              <a:t>1/14/2019</a:t>
             </a:fld>
             <a:endParaRPr lang="en-US"/>
           </a:p>
@@ -5272,7 +5272,7 @@
           <a:p>
             <a:fld id="{5F138F74-D09C-4A4F-9011-F5861002FF66}" type="datetime1">
               <a:rPr lang="en-US" smtClean="0"/>
-              <a:t>1/13/2019</a:t>
+              <a:t>1/14/2019</a:t>
             </a:fld>
             <a:endParaRPr lang="en-US"/>
           </a:p>
@@ -5480,7 +5480,7 @@
           <a:p>
             <a:fld id="{B023AC82-5023-4B40-8E7B-CB32645BA3C1}" type="datetime1">
               <a:rPr lang="en-US" smtClean="0"/>
-              <a:t>1/13/2019</a:t>
+              <a:t>1/14/2019</a:t>
             </a:fld>
             <a:endParaRPr lang="en-US"/>
           </a:p>
@@ -5689,7 +5689,7 @@
           <a:p>
             <a:fld id="{CB9270DE-3C8A-43D2-B05F-DCE66535FA1A}" type="datetime1">
               <a:rPr lang="en-US" smtClean="0"/>
-              <a:t>1/13/2019</a:t>
+              <a:t>1/14/2019</a:t>
             </a:fld>
             <a:endParaRPr lang="en-US"/>
           </a:p>
@@ -5992,7 +5992,7 @@
           <a:p>
             <a:fld id="{5F9A8E4F-B453-4822-A448-33EE436F9AB4}" type="datetime1">
               <a:rPr lang="en-US" smtClean="0"/>
-              <a:t>1/13/2019</a:t>
+              <a:t>1/14/2019</a:t>
             </a:fld>
             <a:endParaRPr lang="en-US"/>
           </a:p>
@@ -6434,7 +6434,7 @@
           <a:p>
             <a:fld id="{F917497C-C63C-412A-9DFD-A2E04718E293}" type="datetime1">
               <a:rPr lang="en-US" smtClean="0"/>
-              <a:t>1/13/2019</a:t>
+              <a:t>1/14/2019</a:t>
             </a:fld>
             <a:endParaRPr lang="en-US"/>
           </a:p>
@@ -6569,7 +6569,7 @@
           <a:p>
             <a:fld id="{F6E66BCC-7079-4559-85D5-50A66D933026}" type="datetime1">
               <a:rPr lang="en-US" smtClean="0"/>
-              <a:t>1/13/2019</a:t>
+              <a:t>1/14/2019</a:t>
             </a:fld>
             <a:endParaRPr lang="en-US"/>
           </a:p>
@@ -6682,7 +6682,7 @@
           <a:p>
             <a:fld id="{6B4C6DDB-E43F-4445-B916-EA8EF73BA2E9}" type="datetime1">
               <a:rPr lang="en-US" smtClean="0"/>
-              <a:t>1/13/2019</a:t>
+              <a:t>1/14/2019</a:t>
             </a:fld>
             <a:endParaRPr lang="en-US"/>
           </a:p>
@@ -6975,7 +6975,7 @@
           <a:p>
             <a:fld id="{28A0BF00-D669-4C78-910C-5733C04ABD2D}" type="datetime1">
               <a:rPr lang="en-US" smtClean="0"/>
-              <a:t>1/13/2019</a:t>
+              <a:t>1/14/2019</a:t>
             </a:fld>
             <a:endParaRPr lang="en-US"/>
           </a:p>
@@ -7249,7 +7249,7 @@
           <a:p>
             <a:fld id="{1D17FF70-BB30-46BB-AA76-2B519CE88675}" type="datetime1">
               <a:rPr lang="en-US" smtClean="0"/>
-              <a:t>1/13/2019</a:t>
+              <a:t>1/14/2019</a:t>
             </a:fld>
             <a:endParaRPr lang="en-US"/>
           </a:p>
@@ -7543,7 +7543,7 @@
           <a:p>
             <a:fld id="{793CCD87-1551-4F91-BE02-F4A09E617739}" type="datetime1">
               <a:rPr lang="en-US" smtClean="0"/>
-              <a:t>1/13/2019</a:t>
+              <a:t>1/14/2019</a:t>
             </a:fld>
             <a:endParaRPr lang="en-US"/>
           </a:p>
@@ -8390,7 +8390,7 @@
           <a:p>
             <a:fld id="{FBD26717-3E2A-491D-9A2B-0D747605CA1D}" type="datetime1">
               <a:rPr lang="en-US" smtClean="0"/>
-              <a:t>1/13/2019</a:t>
+              <a:t>1/14/2019</a:t>
             </a:fld>
             <a:endParaRPr lang="en-US"/>
           </a:p>
@@ -9143,6 +9143,13 @@
   <p:clrMapOvr>
     <a:masterClrMapping/>
   </p:clrMapOvr>
+  <p:timing>
+    <p:tnLst>
+      <p:par>
+        <p:cTn id="1" dur="indefinite" restart="never" nodeType="tmRoot"/>
+      </p:par>
+    </p:tnLst>
+  </p:timing>
 </p:sld>
 </file>
 
@@ -9364,7 +9371,15 @@
             </a:r>
             <a:r>
               <a:rPr lang="es-419" dirty="0" err="1" smtClean="0"/>
-              <a:t>replicate</a:t>
+              <a:t>first</a:t>
+            </a:r>
+            <a:r>
+              <a:rPr lang="es-419" dirty="0" smtClean="0"/>
+              <a:t> m </a:t>
+            </a:r>
+            <a:r>
+              <a:rPr lang="es-419" dirty="0" err="1" smtClean="0"/>
+              <a:t>samples</a:t>
             </a:r>
             <a:r>
               <a:rPr lang="es-419" dirty="0" smtClean="0"/>
@@ -9477,8 +9492,16 @@
               <a:t>function</a:t>
             </a:r>
             <a:r>
+              <a:rPr lang="es-419" smtClean="0"/>
+              <a:t> </a:t>
+            </a:r>
+            <a:r>
+              <a:rPr lang="es-419" smtClean="0"/>
+              <a:t>y=h(x</a:t>
+            </a:r>
+            <a:r>
               <a:rPr lang="es-419" dirty="0" smtClean="0"/>
-              <a:t> h(x)=x^2. </a:t>
+              <a:t>)=x^2. </a:t>
             </a:r>
             <a:r>
               <a:rPr lang="es-419" dirty="0" err="1" smtClean="0"/>
@@ -9892,7 +9915,7 @@
           <a:graphicData uri="http://schemas.openxmlformats.org/presentationml/2006/ole">
             <mc:AlternateContent xmlns:mc="http://schemas.openxmlformats.org/markup-compatibility/2006">
               <mc:Choice xmlns:v="urn:schemas-microsoft-com:vml" Requires="v">
-                <p:oleObj spid="_x0000_s4106" name="Equation" r:id="rId3" imgW="1587240" imgH="330120" progId="Equation.DSMT4">
+                <p:oleObj spid="_x0000_s4111" name="Equation" r:id="rId3" imgW="1587240" imgH="330120" progId="Equation.DSMT4">
                   <p:embed/>
                 </p:oleObj>
               </mc:Choice>
@@ -9937,6 +9960,13 @@
   <p:clrMapOvr>
     <a:masterClrMapping/>
   </p:clrMapOvr>
+  <p:timing>
+    <p:tnLst>
+      <p:par>
+        <p:cTn id="1" dur="indefinite" restart="never" nodeType="tmRoot"/>
+      </p:par>
+    </p:tnLst>
+  </p:timing>
 </p:sld>
 </file>
 
@@ -10349,6 +10379,13 @@
   <p:clrMapOvr>
     <a:masterClrMapping/>
   </p:clrMapOvr>
+  <p:timing>
+    <p:tnLst>
+      <p:par>
+        <p:cTn id="1" dur="indefinite" restart="never" nodeType="tmRoot"/>
+      </p:par>
+    </p:tnLst>
+  </p:timing>
 </p:sld>
 </file>
 
@@ -11031,6 +11068,13 @@
   <p:clrMapOvr>
     <a:masterClrMapping/>
   </p:clrMapOvr>
+  <p:timing>
+    <p:tnLst>
+      <p:par>
+        <p:cTn id="1" dur="indefinite" restart="never" nodeType="tmRoot"/>
+      </p:par>
+    </p:tnLst>
+  </p:timing>
 </p:sld>
 </file>
 
@@ -11568,6 +11612,13 @@
   <p:clrMapOvr>
     <a:masterClrMapping/>
   </p:clrMapOvr>
+  <p:timing>
+    <p:tnLst>
+      <p:par>
+        <p:cTn id="1" dur="indefinite" restart="never" nodeType="tmRoot"/>
+      </p:par>
+    </p:tnLst>
+  </p:timing>
 </p:sld>
 </file>
 
@@ -11681,6 +11732,13 @@
   <p:clrMapOvr>
     <a:masterClrMapping/>
   </p:clrMapOvr>
+  <p:timing>
+    <p:tnLst>
+      <p:par>
+        <p:cTn id="1" dur="indefinite" restart="never" nodeType="tmRoot"/>
+      </p:par>
+    </p:tnLst>
+  </p:timing>
 </p:sld>
 </file>
 
@@ -12196,6 +12254,13 @@
   <p:clrMapOvr>
     <a:masterClrMapping/>
   </p:clrMapOvr>
+  <p:timing>
+    <p:tnLst>
+      <p:par>
+        <p:cTn id="1" dur="indefinite" restart="never" nodeType="tmRoot"/>
+      </p:par>
+    </p:tnLst>
+  </p:timing>
 </p:sld>
 </file>
 
@@ -12519,7 +12584,7 @@
         </p:spPr>
         <p:txBody>
           <a:bodyPr>
-            <a:normAutofit lnSpcReduction="10000"/>
+            <a:normAutofit fontScale="92500"/>
           </a:bodyPr>
           <a:lstStyle/>
           <a:p>
@@ -12760,12 +12825,28 @@
               <a:t>? </a:t>
             </a:r>
             <a:r>
+              <a:rPr lang="es-419" dirty="0" smtClean="0"/>
+              <a:t>[La parte mas </a:t>
+            </a:r>
+            <a:r>
+              <a:rPr lang="es-419" dirty="0" err="1" smtClean="0"/>
+              <a:t>dificil</a:t>
+            </a:r>
+            <a:r>
+              <a:rPr lang="es-419" dirty="0" smtClean="0"/>
+              <a:t>] </a:t>
+            </a:r>
+            <a:r>
               <a:rPr lang="es-419" dirty="0" err="1" smtClean="0"/>
               <a:t>Calculate</a:t>
             </a:r>
             <a:r>
               <a:rPr lang="es-419" dirty="0" smtClean="0"/>
-              <a:t> P(.35&lt;X&lt; .98)</a:t>
+              <a:t> </a:t>
+            </a:r>
+            <a:r>
+              <a:rPr lang="es-419" dirty="0" smtClean="0"/>
+              <a:t>P(.35&lt;X&lt; .98)</a:t>
             </a:r>
           </a:p>
         </p:txBody>
@@ -12821,7 +12902,7 @@
           <a:graphicData uri="http://schemas.openxmlformats.org/presentationml/2006/ole">
             <mc:AlternateContent xmlns:mc="http://schemas.openxmlformats.org/markup-compatibility/2006">
               <mc:Choice xmlns:v="urn:schemas-microsoft-com:vml" Requires="v">
-                <p:oleObj spid="_x0000_s3107" name="Equation" r:id="rId3" imgW="1688760" imgH="711000" progId="Equation.DSMT4">
+                <p:oleObj spid="_x0000_s3112" name="Equation" r:id="rId3" imgW="1688760" imgH="711000" progId="Equation.DSMT4">
                   <p:embed/>
                 </p:oleObj>
               </mc:Choice>
@@ -12866,6 +12947,13 @@
   <p:clrMapOvr>
     <a:masterClrMapping/>
   </p:clrMapOvr>
+  <p:timing>
+    <p:tnLst>
+      <p:par>
+        <p:cTn id="1" dur="indefinite" restart="never" nodeType="tmRoot"/>
+      </p:par>
+    </p:tnLst>
+  </p:timing>
 </p:sld>
 </file>
 

</xml_diff>